<commit_message>
This push fixes README.md references to be correct.
</commit_message>
<xml_diff>
--- a/docs/architecture.pptx
+++ b/docs/architecture.pptx
@@ -243,7 +243,7 @@
           <a:p>
             <a:fld id="{4EF59D9E-7210-7A49-B0C7-4392732B35FE}" type="datetimeFigureOut">
               <a:rPr lang="en-US" smtClean="0"/>
-              <a:t>7/28/16</a:t>
+              <a:t>7/29/16</a:t>
             </a:fld>
             <a:endParaRPr lang="en-US"/>
           </a:p>
@@ -413,7 +413,7 @@
           <a:p>
             <a:fld id="{4EF59D9E-7210-7A49-B0C7-4392732B35FE}" type="datetimeFigureOut">
               <a:rPr lang="en-US" smtClean="0"/>
-              <a:t>7/28/16</a:t>
+              <a:t>7/29/16</a:t>
             </a:fld>
             <a:endParaRPr lang="en-US"/>
           </a:p>
@@ -593,7 +593,7 @@
           <a:p>
             <a:fld id="{4EF59D9E-7210-7A49-B0C7-4392732B35FE}" type="datetimeFigureOut">
               <a:rPr lang="en-US" smtClean="0"/>
-              <a:t>7/28/16</a:t>
+              <a:t>7/29/16</a:t>
             </a:fld>
             <a:endParaRPr lang="en-US"/>
           </a:p>
@@ -763,7 +763,7 @@
           <a:p>
             <a:fld id="{4EF59D9E-7210-7A49-B0C7-4392732B35FE}" type="datetimeFigureOut">
               <a:rPr lang="en-US" smtClean="0"/>
-              <a:t>7/28/16</a:t>
+              <a:t>7/29/16</a:t>
             </a:fld>
             <a:endParaRPr lang="en-US"/>
           </a:p>
@@ -1009,7 +1009,7 @@
           <a:p>
             <a:fld id="{4EF59D9E-7210-7A49-B0C7-4392732B35FE}" type="datetimeFigureOut">
               <a:rPr lang="en-US" smtClean="0"/>
-              <a:t>7/28/16</a:t>
+              <a:t>7/29/16</a:t>
             </a:fld>
             <a:endParaRPr lang="en-US"/>
           </a:p>
@@ -1241,7 +1241,7 @@
           <a:p>
             <a:fld id="{4EF59D9E-7210-7A49-B0C7-4392732B35FE}" type="datetimeFigureOut">
               <a:rPr lang="en-US" smtClean="0"/>
-              <a:t>7/28/16</a:t>
+              <a:t>7/29/16</a:t>
             </a:fld>
             <a:endParaRPr lang="en-US"/>
           </a:p>
@@ -1608,7 +1608,7 @@
           <a:p>
             <a:fld id="{4EF59D9E-7210-7A49-B0C7-4392732B35FE}" type="datetimeFigureOut">
               <a:rPr lang="en-US" smtClean="0"/>
-              <a:t>7/28/16</a:t>
+              <a:t>7/29/16</a:t>
             </a:fld>
             <a:endParaRPr lang="en-US"/>
           </a:p>
@@ -1726,7 +1726,7 @@
           <a:p>
             <a:fld id="{4EF59D9E-7210-7A49-B0C7-4392732B35FE}" type="datetimeFigureOut">
               <a:rPr lang="en-US" smtClean="0"/>
-              <a:t>7/28/16</a:t>
+              <a:t>7/29/16</a:t>
             </a:fld>
             <a:endParaRPr lang="en-US"/>
           </a:p>
@@ -1821,7 +1821,7 @@
           <a:p>
             <a:fld id="{4EF59D9E-7210-7A49-B0C7-4392732B35FE}" type="datetimeFigureOut">
               <a:rPr lang="en-US" smtClean="0"/>
-              <a:t>7/28/16</a:t>
+              <a:t>7/29/16</a:t>
             </a:fld>
             <a:endParaRPr lang="en-US"/>
           </a:p>
@@ -2098,7 +2098,7 @@
           <a:p>
             <a:fld id="{4EF59D9E-7210-7A49-B0C7-4392732B35FE}" type="datetimeFigureOut">
               <a:rPr lang="en-US" smtClean="0"/>
-              <a:t>7/28/16</a:t>
+              <a:t>7/29/16</a:t>
             </a:fld>
             <a:endParaRPr lang="en-US"/>
           </a:p>
@@ -2351,7 +2351,7 @@
           <a:p>
             <a:fld id="{4EF59D9E-7210-7A49-B0C7-4392732B35FE}" type="datetimeFigureOut">
               <a:rPr lang="en-US" smtClean="0"/>
-              <a:t>7/28/16</a:t>
+              <a:t>7/29/16</a:t>
             </a:fld>
             <a:endParaRPr lang="en-US"/>
           </a:p>
@@ -2564,7 +2564,7 @@
           <a:p>
             <a:fld id="{4EF59D9E-7210-7A49-B0C7-4392732B35FE}" type="datetimeFigureOut">
               <a:rPr lang="en-US" smtClean="0"/>
-              <a:t>7/28/16</a:t>
+              <a:t>7/29/16</a:t>
             </a:fld>
             <a:endParaRPr lang="en-US"/>
           </a:p>
@@ -3775,7 +3775,7 @@
         </p:nvSpPr>
         <p:spPr>
           <a:xfrm>
-            <a:off x="2700313" y="2653249"/>
+            <a:off x="2700313" y="3099149"/>
             <a:ext cx="1557221" cy="369332"/>
           </a:xfrm>
           <a:prstGeom prst="rect">

</xml_diff>